<commit_message>
Added Graphs to powerpoint
</commit_message>
<xml_diff>
--- a/Assignment 2 Presentation.pptx
+++ b/Assignment 2 Presentation.pptx
@@ -25,8 +25,8 @@
     <p:sldId id="269" r:id="rId16"/>
     <p:sldId id="270" r:id="rId17"/>
     <p:sldId id="271" r:id="rId18"/>
-    <p:sldId id="272" r:id="rId19"/>
-    <p:sldId id="273" r:id="rId20"/>
+    <p:sldId id="276" r:id="rId19"/>
+    <p:sldId id="272" r:id="rId20"/>
     <p:sldId id="274" r:id="rId21"/>
   </p:sldIdLst>
   <p:sldSz cx="12192000" cy="6858000"/>
@@ -216,7 +216,7 @@
           <a:p>
             <a:fld id="{EA5B0478-17CE-0C46-A494-EAFE1B935567}" type="datetimeFigureOut">
               <a:rPr lang="en-US" smtClean="0"/>
-              <a:t>10/22/23</a:t>
+              <a:t>10/23/2023</a:t>
             </a:fld>
             <a:endParaRPr lang="en-US"/>
           </a:p>
@@ -633,7 +633,7 @@
           <a:p>
             <a:fld id="{A06F8F1B-22C4-DA4F-8CD3-28F281EF46A6}" type="datetimeFigureOut">
               <a:rPr lang="en-US" smtClean="0"/>
-              <a:t>10/22/23</a:t>
+              <a:t>10/23/2023</a:t>
             </a:fld>
             <a:endParaRPr lang="en-US"/>
           </a:p>
@@ -833,7 +833,7 @@
           <a:p>
             <a:fld id="{A06F8F1B-22C4-DA4F-8CD3-28F281EF46A6}" type="datetimeFigureOut">
               <a:rPr lang="en-US" smtClean="0"/>
-              <a:t>10/22/23</a:t>
+              <a:t>10/23/2023</a:t>
             </a:fld>
             <a:endParaRPr lang="en-US"/>
           </a:p>
@@ -1043,7 +1043,7 @@
           <a:p>
             <a:fld id="{A06F8F1B-22C4-DA4F-8CD3-28F281EF46A6}" type="datetimeFigureOut">
               <a:rPr lang="en-US" smtClean="0"/>
-              <a:t>10/22/23</a:t>
+              <a:t>10/23/2023</a:t>
             </a:fld>
             <a:endParaRPr lang="en-US"/>
           </a:p>
@@ -1243,7 +1243,7 @@
           <a:p>
             <a:fld id="{A06F8F1B-22C4-DA4F-8CD3-28F281EF46A6}" type="datetimeFigureOut">
               <a:rPr lang="en-US" smtClean="0"/>
-              <a:t>10/22/23</a:t>
+              <a:t>10/23/2023</a:t>
             </a:fld>
             <a:endParaRPr lang="en-US"/>
           </a:p>
@@ -1519,7 +1519,7 @@
           <a:p>
             <a:fld id="{A06F8F1B-22C4-DA4F-8CD3-28F281EF46A6}" type="datetimeFigureOut">
               <a:rPr lang="en-US" smtClean="0"/>
-              <a:t>10/22/23</a:t>
+              <a:t>10/23/2023</a:t>
             </a:fld>
             <a:endParaRPr lang="en-US"/>
           </a:p>
@@ -1787,7 +1787,7 @@
           <a:p>
             <a:fld id="{A06F8F1B-22C4-DA4F-8CD3-28F281EF46A6}" type="datetimeFigureOut">
               <a:rPr lang="en-US" smtClean="0"/>
-              <a:t>10/22/23</a:t>
+              <a:t>10/23/2023</a:t>
             </a:fld>
             <a:endParaRPr lang="en-US"/>
           </a:p>
@@ -2202,7 +2202,7 @@
           <a:p>
             <a:fld id="{A06F8F1B-22C4-DA4F-8CD3-28F281EF46A6}" type="datetimeFigureOut">
               <a:rPr lang="en-US" smtClean="0"/>
-              <a:t>10/22/23</a:t>
+              <a:t>10/23/2023</a:t>
             </a:fld>
             <a:endParaRPr lang="en-US"/>
           </a:p>
@@ -2344,7 +2344,7 @@
           <a:p>
             <a:fld id="{A06F8F1B-22C4-DA4F-8CD3-28F281EF46A6}" type="datetimeFigureOut">
               <a:rPr lang="en-US" smtClean="0"/>
-              <a:t>10/22/23</a:t>
+              <a:t>10/23/2023</a:t>
             </a:fld>
             <a:endParaRPr lang="en-US"/>
           </a:p>
@@ -2457,7 +2457,7 @@
           <a:p>
             <a:fld id="{A06F8F1B-22C4-DA4F-8CD3-28F281EF46A6}" type="datetimeFigureOut">
               <a:rPr lang="en-US" smtClean="0"/>
-              <a:t>10/22/23</a:t>
+              <a:t>10/23/2023</a:t>
             </a:fld>
             <a:endParaRPr lang="en-US"/>
           </a:p>
@@ -2770,7 +2770,7 @@
           <a:p>
             <a:fld id="{A06F8F1B-22C4-DA4F-8CD3-28F281EF46A6}" type="datetimeFigureOut">
               <a:rPr lang="en-US" smtClean="0"/>
-              <a:t>10/22/23</a:t>
+              <a:t>10/23/2023</a:t>
             </a:fld>
             <a:endParaRPr lang="en-US"/>
           </a:p>
@@ -3059,7 +3059,7 @@
           <a:p>
             <a:fld id="{A06F8F1B-22C4-DA4F-8CD3-28F281EF46A6}" type="datetimeFigureOut">
               <a:rPr lang="en-US" smtClean="0"/>
-              <a:t>10/22/23</a:t>
+              <a:t>10/23/2023</a:t>
             </a:fld>
             <a:endParaRPr lang="en-US"/>
           </a:p>
@@ -3302,7 +3302,7 @@
           <a:p>
             <a:fld id="{A06F8F1B-22C4-DA4F-8CD3-28F281EF46A6}" type="datetimeFigureOut">
               <a:rPr lang="en-US" smtClean="0"/>
-              <a:t>10/22/23</a:t>
+              <a:t>10/23/2023</a:t>
             </a:fld>
             <a:endParaRPr lang="en-US"/>
           </a:p>
@@ -4657,6 +4657,36 @@
           </a:p>
         </p:txBody>
       </p:sp>
+      <p:pic>
+        <p:nvPicPr>
+          <p:cNvPr id="6" name="Picture 5">
+            <a:extLst>
+              <a:ext uri="{FF2B5EF4-FFF2-40B4-BE49-F238E27FC236}">
+                <a16:creationId xmlns:a16="http://schemas.microsoft.com/office/drawing/2014/main" id="{67FD83ED-908D-6489-FA2B-2579B83ACEB7}"/>
+              </a:ext>
+            </a:extLst>
+          </p:cNvPr>
+          <p:cNvPicPr>
+            <a:picLocks noChangeAspect="1"/>
+          </p:cNvPicPr>
+          <p:nvPr/>
+        </p:nvPicPr>
+        <p:blipFill>
+          <a:blip r:embed="rId2"/>
+          <a:stretch>
+            <a:fillRect/>
+          </a:stretch>
+        </p:blipFill>
+        <p:spPr>
+          <a:xfrm>
+            <a:off x="746659" y="4216606"/>
+            <a:ext cx="10698681" cy="1960357"/>
+          </a:xfrm>
+          <a:prstGeom prst="rect">
+            <a:avLst/>
+          </a:prstGeom>
+        </p:spPr>
+      </p:pic>
     </p:spTree>
     <p:extLst>
       <p:ext uri="{BB962C8B-B14F-4D97-AF65-F5344CB8AC3E}">
@@ -4837,7 +4867,7 @@
         </p:nvSpPr>
         <p:spPr>
           <a:xfrm>
-            <a:off x="838200" y="365125"/>
+            <a:off x="826770" y="365740"/>
             <a:ext cx="10515600" cy="686435"/>
           </a:xfrm>
         </p:spPr>
@@ -4872,7 +4902,7 @@
         </p:nvSpPr>
         <p:spPr>
           <a:xfrm>
-            <a:off x="838200" y="1154430"/>
+            <a:off x="838200" y="1126509"/>
             <a:ext cx="10515600" cy="5022533"/>
           </a:xfrm>
         </p:spPr>
@@ -4944,6 +4974,36 @@
           </a:p>
         </p:txBody>
       </p:sp>
+      <p:pic>
+        <p:nvPicPr>
+          <p:cNvPr id="6" name="Picture 5" descr="A graph of lines and numbers&#10;&#10;Description automatically generated with medium confidence">
+            <a:extLst>
+              <a:ext uri="{FF2B5EF4-FFF2-40B4-BE49-F238E27FC236}">
+                <a16:creationId xmlns:a16="http://schemas.microsoft.com/office/drawing/2014/main" id="{D6B15BFE-1133-B0D7-4A0C-18E03460CEA5}"/>
+              </a:ext>
+            </a:extLst>
+          </p:cNvPr>
+          <p:cNvPicPr>
+            <a:picLocks noChangeAspect="1"/>
+          </p:cNvPicPr>
+          <p:nvPr/>
+        </p:nvPicPr>
+        <p:blipFill>
+          <a:blip r:embed="rId2"/>
+          <a:stretch>
+            <a:fillRect/>
+          </a:stretch>
+        </p:blipFill>
+        <p:spPr>
+          <a:xfrm>
+            <a:off x="1345105" y="2036459"/>
+            <a:ext cx="9194290" cy="4456416"/>
+          </a:xfrm>
+          <a:prstGeom prst="rect">
+            <a:avLst/>
+          </a:prstGeom>
+        </p:spPr>
+      </p:pic>
     </p:spTree>
     <p:extLst>
       <p:ext uri="{BB962C8B-B14F-4D97-AF65-F5344CB8AC3E}">
@@ -5231,6 +5291,36 @@
           </a:p>
         </p:txBody>
       </p:sp>
+      <p:pic>
+        <p:nvPicPr>
+          <p:cNvPr id="6" name="Picture 5">
+            <a:extLst>
+              <a:ext uri="{FF2B5EF4-FFF2-40B4-BE49-F238E27FC236}">
+                <a16:creationId xmlns:a16="http://schemas.microsoft.com/office/drawing/2014/main" id="{BD35B0DF-6BE5-1F98-678C-345989947F72}"/>
+              </a:ext>
+            </a:extLst>
+          </p:cNvPr>
+          <p:cNvPicPr>
+            <a:picLocks noChangeAspect="1"/>
+          </p:cNvPicPr>
+          <p:nvPr/>
+        </p:nvPicPr>
+        <p:blipFill>
+          <a:blip r:embed="rId2"/>
+          <a:stretch>
+            <a:fillRect/>
+          </a:stretch>
+        </p:blipFill>
+        <p:spPr>
+          <a:xfrm>
+            <a:off x="664644" y="3828871"/>
+            <a:ext cx="10740606" cy="2450962"/>
+          </a:xfrm>
+          <a:prstGeom prst="rect">
+            <a:avLst/>
+          </a:prstGeom>
+        </p:spPr>
+      </p:pic>
     </p:spTree>
     <p:extLst>
       <p:ext uri="{BB962C8B-B14F-4D97-AF65-F5344CB8AC3E}">
@@ -5518,6 +5608,36 @@
           </a:p>
         </p:txBody>
       </p:sp>
+      <p:pic>
+        <p:nvPicPr>
+          <p:cNvPr id="6" name="Picture 5" descr="A graph of a graph of a person's body&#10;&#10;Description automatically generated with medium confidence">
+            <a:extLst>
+              <a:ext uri="{FF2B5EF4-FFF2-40B4-BE49-F238E27FC236}">
+                <a16:creationId xmlns:a16="http://schemas.microsoft.com/office/drawing/2014/main" id="{E5D7535B-6098-47C7-47EF-062A46A86C5F}"/>
+              </a:ext>
+            </a:extLst>
+          </p:cNvPr>
+          <p:cNvPicPr>
+            <a:picLocks noChangeAspect="1"/>
+          </p:cNvPicPr>
+          <p:nvPr/>
+        </p:nvPicPr>
+        <p:blipFill>
+          <a:blip r:embed="rId2"/>
+          <a:stretch>
+            <a:fillRect/>
+          </a:stretch>
+        </p:blipFill>
+        <p:spPr>
+          <a:xfrm>
+            <a:off x="2134053" y="2488685"/>
+            <a:ext cx="7923893" cy="3977362"/>
+          </a:xfrm>
+          <a:prstGeom prst="rect">
+            <a:avLst/>
+          </a:prstGeom>
+        </p:spPr>
+      </p:pic>
     </p:spTree>
     <p:extLst>
       <p:ext uri="{BB962C8B-B14F-4D97-AF65-F5344CB8AC3E}">
@@ -6314,7 +6434,7 @@
           <a:p>
             <a:r>
               <a:rPr lang="en-US" sz="3200" b="1" dirty="0"/>
-              <a:t>16. Testing results</a:t>
+              <a:t>16. Model V: AdaBoost (1/2)</a:t>
             </a:r>
           </a:p>
         </p:txBody>
@@ -6360,7 +6480,7 @@
           <p:cNvPr id="6" name="Rectangle 5">
             <a:extLst>
               <a:ext uri="{FF2B5EF4-FFF2-40B4-BE49-F238E27FC236}">
-                <a16:creationId xmlns:a16="http://schemas.microsoft.com/office/drawing/2014/main" id="{E1058817-4DAA-01ED-90B2-23B9F68FFDBE}"/>
+                <a16:creationId xmlns:a16="http://schemas.microsoft.com/office/drawing/2014/main" id="{AC1B3835-2D0F-6749-B29A-4DDA103AFE2D}"/>
               </a:ext>
             </a:extLst>
           </p:cNvPr>
@@ -6409,21 +6529,81 @@
           </a:p>
         </p:txBody>
       </p:sp>
+      <p:pic>
+        <p:nvPicPr>
+          <p:cNvPr id="4" name="Picture 3" descr="A graph of a mass balancing technique&#10;&#10;Description automatically generated">
+            <a:extLst>
+              <a:ext uri="{FF2B5EF4-FFF2-40B4-BE49-F238E27FC236}">
+                <a16:creationId xmlns:a16="http://schemas.microsoft.com/office/drawing/2014/main" id="{6CF06D82-08E6-4803-8545-B2601F1D4A5D}"/>
+              </a:ext>
+            </a:extLst>
+          </p:cNvPr>
+          <p:cNvPicPr>
+            <a:picLocks noChangeAspect="1"/>
+          </p:cNvPicPr>
+          <p:nvPr/>
+        </p:nvPicPr>
+        <p:blipFill>
+          <a:blip r:embed="rId2"/>
+          <a:stretch>
+            <a:fillRect/>
+          </a:stretch>
+        </p:blipFill>
+        <p:spPr>
+          <a:xfrm>
+            <a:off x="900530" y="3659197"/>
+            <a:ext cx="5184040" cy="2620636"/>
+          </a:xfrm>
+          <a:prstGeom prst="rect">
+            <a:avLst/>
+          </a:prstGeom>
+        </p:spPr>
+      </p:pic>
+      <p:pic>
+        <p:nvPicPr>
+          <p:cNvPr id="7" name="Picture 6">
+            <a:extLst>
+              <a:ext uri="{FF2B5EF4-FFF2-40B4-BE49-F238E27FC236}">
+                <a16:creationId xmlns:a16="http://schemas.microsoft.com/office/drawing/2014/main" id="{66A7F2E8-61D4-E096-CED4-A91FBCFFC113}"/>
+              </a:ext>
+            </a:extLst>
+          </p:cNvPr>
+          <p:cNvPicPr>
+            <a:picLocks noChangeAspect="1"/>
+          </p:cNvPicPr>
+          <p:nvPr/>
+        </p:nvPicPr>
+        <p:blipFill>
+          <a:blip r:embed="rId3"/>
+          <a:stretch>
+            <a:fillRect/>
+          </a:stretch>
+        </p:blipFill>
+        <p:spPr>
+          <a:xfrm>
+            <a:off x="6427120" y="3665696"/>
+            <a:ext cx="4864350" cy="2171812"/>
+          </a:xfrm>
+          <a:prstGeom prst="rect">
+            <a:avLst/>
+          </a:prstGeom>
+        </p:spPr>
+      </p:pic>
     </p:spTree>
     <p:extLst>
       <p:ext uri="{BB962C8B-B14F-4D97-AF65-F5344CB8AC3E}">
-        <p14:creationId xmlns:p14="http://schemas.microsoft.com/office/powerpoint/2010/main" val="3183449224"/>
+        <p14:creationId xmlns:p14="http://schemas.microsoft.com/office/powerpoint/2010/main" val="541833950"/>
       </p:ext>
     </p:extLst>
   </p:cSld>
   <p:clrMapOvr>
     <a:masterClrMapping/>
   </p:clrMapOvr>
-  <mc:AlternateContent xmlns:mc="http://schemas.openxmlformats.org/markup-compatibility/2006" xmlns:p14="http://schemas.microsoft.com/office/powerpoint/2010/main">
-    <mc:Choice Requires="p14">
+  <mc:AlternateContent xmlns:mc="http://schemas.openxmlformats.org/markup-compatibility/2006">
+    <mc:Choice xmlns:p14="http://schemas.microsoft.com/office/powerpoint/2010/main" Requires="p14">
       <p:transition spd="slow" p14:dur="2000" advTm="20000"/>
     </mc:Choice>
-    <mc:Fallback xmlns="">
+    <mc:Fallback>
       <p:transition spd="slow" advTm="20000"/>
     </mc:Fallback>
   </mc:AlternateContent>
@@ -6601,7 +6781,7 @@
           <a:p>
             <a:r>
               <a:rPr lang="en-US" sz="3200" b="1" dirty="0"/>
-              <a:t>17. Proposed Model</a:t>
+              <a:t>17. Testing results and Proposed Model</a:t>
             </a:r>
           </a:p>
         </p:txBody>
@@ -6644,10 +6824,10 @@
       </p:sp>
       <p:sp>
         <p:nvSpPr>
-          <p:cNvPr id="4" name="Rectangle 3">
-            <a:extLst>
-              <a:ext uri="{FF2B5EF4-FFF2-40B4-BE49-F238E27FC236}">
-                <a16:creationId xmlns:a16="http://schemas.microsoft.com/office/drawing/2014/main" id="{DD6656CA-5A19-6DCA-142F-9045EB669DAE}"/>
+          <p:cNvPr id="6" name="Rectangle 5">
+            <a:extLst>
+              <a:ext uri="{FF2B5EF4-FFF2-40B4-BE49-F238E27FC236}">
+                <a16:creationId xmlns:a16="http://schemas.microsoft.com/office/drawing/2014/main" id="{E1058817-4DAA-01ED-90B2-23B9F68FFDBE}"/>
               </a:ext>
             </a:extLst>
           </p:cNvPr>
@@ -6696,10 +6876,40 @@
           </a:p>
         </p:txBody>
       </p:sp>
+      <p:pic>
+        <p:nvPicPr>
+          <p:cNvPr id="4" name="Picture 3">
+            <a:extLst>
+              <a:ext uri="{FF2B5EF4-FFF2-40B4-BE49-F238E27FC236}">
+                <a16:creationId xmlns:a16="http://schemas.microsoft.com/office/drawing/2014/main" id="{41148E0C-B090-6D61-3E5D-B28C5AA9A633}"/>
+              </a:ext>
+            </a:extLst>
+          </p:cNvPr>
+          <p:cNvPicPr>
+            <a:picLocks noChangeAspect="1"/>
+          </p:cNvPicPr>
+          <p:nvPr/>
+        </p:nvPicPr>
+        <p:blipFill>
+          <a:blip r:embed="rId2"/>
+          <a:stretch>
+            <a:fillRect/>
+          </a:stretch>
+        </p:blipFill>
+        <p:spPr>
+          <a:xfrm>
+            <a:off x="2035560" y="2216087"/>
+            <a:ext cx="8098020" cy="3960876"/>
+          </a:xfrm>
+          <a:prstGeom prst="rect">
+            <a:avLst/>
+          </a:prstGeom>
+        </p:spPr>
+      </p:pic>
     </p:spTree>
     <p:extLst>
       <p:ext uri="{BB962C8B-B14F-4D97-AF65-F5344CB8AC3E}">
-        <p14:creationId xmlns:p14="http://schemas.microsoft.com/office/powerpoint/2010/main" val="3361791043"/>
+        <p14:creationId xmlns:p14="http://schemas.microsoft.com/office/powerpoint/2010/main" val="3183449224"/>
       </p:ext>
     </p:extLst>
   </p:cSld>
@@ -6744,7 +6954,7 @@
                                       <p:cBhvr additive="base">
                                         <p:cTn id="6" dur="20000"/>
                                         <p:tgtEl>
-                                          <p:spTgt spid="4"/>
+                                          <p:spTgt spid="6"/>
                                         </p:tgtEl>
                                         <p:attrNameLst>
                                           <p:attrName>ppt_x</p:attrName>
@@ -6767,7 +6977,7 @@
                                       <p:cBhvr additive="base">
                                         <p:cTn id="7" dur="20000"/>
                                         <p:tgtEl>
-                                          <p:spTgt spid="4"/>
+                                          <p:spTgt spid="6"/>
                                         </p:tgtEl>
                                         <p:attrNameLst>
                                           <p:attrName>ppt_y</p:attrName>
@@ -6794,7 +7004,7 @@
                                           </p:stCondLst>
                                         </p:cTn>
                                         <p:tgtEl>
-                                          <p:spTgt spid="4"/>
+                                          <p:spTgt spid="6"/>
                                         </p:tgtEl>
                                         <p:attrNameLst>
                                           <p:attrName>style.visibility</p:attrName>
@@ -6835,7 +7045,7 @@
       </p:par>
     </p:tnLst>
     <p:bldLst>
-      <p:bldP spid="4" grpId="0" animBg="1"/>
+      <p:bldP spid="6" grpId="0" animBg="1"/>
     </p:bldLst>
   </p:timing>
 </p:sld>
@@ -7992,7 +8202,7 @@
         </p:blipFill>
         <p:spPr>
           <a:xfrm>
-            <a:off x="658631" y="2245489"/>
+            <a:off x="498088" y="2407251"/>
             <a:ext cx="7903901" cy="3931474"/>
           </a:xfrm>
           <a:prstGeom prst="rect">
@@ -9454,42 +9664,6 @@
       </p:sp>
       <p:sp>
         <p:nvSpPr>
-          <p:cNvPr id="3" name="Content Placeholder 2">
-            <a:extLst>
-              <a:ext uri="{FF2B5EF4-FFF2-40B4-BE49-F238E27FC236}">
-                <a16:creationId xmlns:a16="http://schemas.microsoft.com/office/drawing/2014/main" id="{E4D5581F-B25B-B880-6B10-775AA6ABB024}"/>
-              </a:ext>
-            </a:extLst>
-          </p:cNvPr>
-          <p:cNvSpPr>
-            <a:spLocks noGrp="1"/>
-          </p:cNvSpPr>
-          <p:nvPr>
-            <p:ph idx="1"/>
-          </p:nvPr>
-        </p:nvSpPr>
-        <p:spPr>
-          <a:xfrm>
-            <a:off x="838200" y="1154430"/>
-            <a:ext cx="10515600" cy="5022533"/>
-          </a:xfrm>
-        </p:spPr>
-        <p:txBody>
-          <a:bodyPr>
-            <a:normAutofit/>
-          </a:bodyPr>
-          <a:lstStyle/>
-          <a:p>
-            <a:r>
-              <a:rPr lang="en-US" sz="1600" b="1" dirty="0"/>
-              <a:t>[.]</a:t>
-            </a:r>
-            <a:endParaRPr lang="en-US" sz="1600" dirty="0"/>
-          </a:p>
-        </p:txBody>
-      </p:sp>
-      <p:sp>
-        <p:nvSpPr>
           <p:cNvPr id="4" name="Rectangle 3">
             <a:extLst>
               <a:ext uri="{FF2B5EF4-FFF2-40B4-BE49-F238E27FC236}">
@@ -9539,6 +9713,333 @@
           <a:p>
             <a:pPr algn="ctr"/>
             <a:endParaRPr lang="en-US"/>
+          </a:p>
+        </p:txBody>
+      </p:sp>
+      <p:sp>
+        <p:nvSpPr>
+          <p:cNvPr id="5" name="Rectangle 1">
+            <a:extLst>
+              <a:ext uri="{FF2B5EF4-FFF2-40B4-BE49-F238E27FC236}">
+                <a16:creationId xmlns:a16="http://schemas.microsoft.com/office/drawing/2014/main" id="{67A783AC-A6FE-B6C7-B9B6-1D31885D9411}"/>
+              </a:ext>
+            </a:extLst>
+          </p:cNvPr>
+          <p:cNvSpPr>
+            <a:spLocks noGrp="1" noChangeArrowheads="1"/>
+          </p:cNvSpPr>
+          <p:nvPr>
+            <p:ph idx="1"/>
+          </p:nvPr>
+        </p:nvSpPr>
+        <p:spPr bwMode="auto">
+          <a:xfrm>
+            <a:off x="838200" y="1680379"/>
+            <a:ext cx="10515600" cy="3970318"/>
+          </a:xfrm>
+          <a:prstGeom prst="rect">
+            <a:avLst/>
+          </a:prstGeom>
+          <a:noFill/>
+          <a:ln>
+            <a:noFill/>
+          </a:ln>
+          <a:effectLst/>
+          <a:extLst>
+            <a:ext uri="{909E8E84-426E-40DD-AFC4-6F175D3DCCD1}">
+              <a14:hiddenFill xmlns:a14="http://schemas.microsoft.com/office/drawing/2010/main">
+                <a:solidFill>
+                  <a:schemeClr val="accent1"/>
+                </a:solidFill>
+              </a14:hiddenFill>
+            </a:ext>
+            <a:ext uri="{91240B29-F687-4F45-9708-019B960494DF}">
+              <a14:hiddenLine xmlns:a14="http://schemas.microsoft.com/office/drawing/2010/main" w="9525">
+                <a:solidFill>
+                  <a:schemeClr val="tx1"/>
+                </a:solidFill>
+                <a:miter lim="800000"/>
+                <a:headEnd/>
+                <a:tailEnd/>
+              </a14:hiddenLine>
+            </a:ext>
+            <a:ext uri="{AF507438-7753-43E0-B8FC-AC1667EBCBE1}">
+              <a14:hiddenEffects xmlns:a14="http://schemas.microsoft.com/office/drawing/2010/main">
+                <a:effectLst>
+                  <a:outerShdw dist="35921" dir="2700000" algn="ctr" rotWithShape="0">
+                    <a:schemeClr val="bg2"/>
+                  </a:outerShdw>
+                </a:effectLst>
+              </a14:hiddenEffects>
+            </a:ext>
+          </a:extLst>
+        </p:spPr>
+        <p:txBody>
+          <a:bodyPr vert="horz" wrap="square" lIns="91440" tIns="45720" rIns="91440" bIns="45720" numCol="1" anchor="ctr" anchorCtr="0" compatLnSpc="1">
+            <a:prstTxWarp prst="textNoShape">
+              <a:avLst/>
+            </a:prstTxWarp>
+            <a:spAutoFit/>
+          </a:bodyPr>
+          <a:lstStyle/>
+          <a:p>
+            <a:pPr marL="0" marR="0" lvl="0" indent="0" algn="l" defTabSz="914400" rtl="0" eaLnBrk="0" fontAlgn="base" latinLnBrk="0" hangingPunct="0">
+              <a:lnSpc>
+                <a:spcPct val="100000"/>
+              </a:lnSpc>
+              <a:spcBef>
+                <a:spcPct val="0"/>
+              </a:spcBef>
+              <a:spcAft>
+                <a:spcPct val="0"/>
+              </a:spcAft>
+              <a:buClrTx/>
+              <a:buSzTx/>
+              <a:buFontTx/>
+              <a:buChar char="•"/>
+              <a:tabLst/>
+            </a:pPr>
+            <a:r>
+              <a:rPr kumimoji="0" lang="en-US" altLang="en-US" sz="1800" b="1" i="0" u="none" strike="noStrike" cap="none" normalizeH="0" baseline="0" dirty="0">
+                <a:ln>
+                  <a:noFill/>
+                </a:ln>
+                <a:solidFill>
+                  <a:schemeClr val="tx1"/>
+                </a:solidFill>
+                <a:effectLst/>
+                <a:latin typeface="Arial" panose="020B0604020202020204" pitchFamily="34" charset="0"/>
+              </a:rPr>
+              <a:t>Min-max scaling:</a:t>
+            </a:r>
+            <a:r>
+              <a:rPr kumimoji="0" lang="en-US" altLang="en-US" sz="1800" b="0" i="0" u="none" strike="noStrike" cap="none" normalizeH="0" baseline="0" dirty="0">
+                <a:ln>
+                  <a:noFill/>
+                </a:ln>
+                <a:solidFill>
+                  <a:schemeClr val="tx1"/>
+                </a:solidFill>
+                <a:effectLst/>
+                <a:latin typeface="Arial" panose="020B0604020202020204" pitchFamily="34" charset="0"/>
+              </a:rPr>
+              <a:t> applied to numerical data (excluding the target) to remove bias from large values. </a:t>
+            </a:r>
+          </a:p>
+          <a:p>
+            <a:pPr marL="0" marR="0" lvl="0" indent="0" algn="l" defTabSz="914400" rtl="0" eaLnBrk="0" fontAlgn="base" latinLnBrk="0" hangingPunct="0">
+              <a:lnSpc>
+                <a:spcPct val="100000"/>
+              </a:lnSpc>
+              <a:spcBef>
+                <a:spcPct val="0"/>
+              </a:spcBef>
+              <a:spcAft>
+                <a:spcPct val="0"/>
+              </a:spcAft>
+              <a:buClrTx/>
+              <a:buSzTx/>
+              <a:buFontTx/>
+              <a:buChar char="•"/>
+              <a:tabLst/>
+            </a:pPr>
+            <a:r>
+              <a:rPr kumimoji="0" lang="en-US" altLang="en-US" sz="1800" b="1" i="0" u="none" strike="noStrike" cap="none" normalizeH="0" baseline="0" dirty="0">
+                <a:ln>
+                  <a:noFill/>
+                </a:ln>
+                <a:solidFill>
+                  <a:schemeClr val="tx1"/>
+                </a:solidFill>
+                <a:effectLst/>
+                <a:latin typeface="Arial" panose="020B0604020202020204" pitchFamily="34" charset="0"/>
+              </a:rPr>
+              <a:t>One-hot-encode:</a:t>
+            </a:r>
+            <a:r>
+              <a:rPr kumimoji="0" lang="en-US" altLang="en-US" sz="1800" b="0" i="0" u="none" strike="noStrike" cap="none" normalizeH="0" baseline="0" dirty="0">
+                <a:ln>
+                  <a:noFill/>
+                </a:ln>
+                <a:solidFill>
+                  <a:schemeClr val="tx1"/>
+                </a:solidFill>
+                <a:effectLst/>
+                <a:latin typeface="Arial" panose="020B0604020202020204" pitchFamily="34" charset="0"/>
+              </a:rPr>
+              <a:t> applied to categorical data (excluding the target) to create binary representation of each categorical value. This is done as some machine learning models require numerical input. </a:t>
+            </a:r>
+          </a:p>
+          <a:p>
+            <a:pPr marL="0" marR="0" lvl="0" indent="0" algn="l" defTabSz="914400" rtl="0" eaLnBrk="0" fontAlgn="base" latinLnBrk="0" hangingPunct="0">
+              <a:lnSpc>
+                <a:spcPct val="100000"/>
+              </a:lnSpc>
+              <a:spcBef>
+                <a:spcPct val="0"/>
+              </a:spcBef>
+              <a:spcAft>
+                <a:spcPct val="0"/>
+              </a:spcAft>
+              <a:buClrTx/>
+              <a:buSzTx/>
+              <a:buFontTx/>
+              <a:buChar char="•"/>
+              <a:tabLst/>
+            </a:pPr>
+            <a:r>
+              <a:rPr kumimoji="0" lang="en-US" altLang="en-US" sz="1800" b="1" i="0" u="none" strike="noStrike" cap="none" normalizeH="0" baseline="0" dirty="0">
+                <a:ln>
+                  <a:noFill/>
+                </a:ln>
+                <a:solidFill>
+                  <a:schemeClr val="tx1"/>
+                </a:solidFill>
+                <a:effectLst/>
+                <a:latin typeface="Arial" panose="020B0604020202020204" pitchFamily="34" charset="0"/>
+              </a:rPr>
+              <a:t>Synthetic Minority Over-sampling Technique (SMOTE):</a:t>
+            </a:r>
+            <a:r>
+              <a:rPr kumimoji="0" lang="en-US" altLang="en-US" sz="1800" b="0" i="0" u="none" strike="noStrike" cap="none" normalizeH="0" baseline="0" dirty="0">
+                <a:ln>
+                  <a:noFill/>
+                </a:ln>
+                <a:solidFill>
+                  <a:schemeClr val="tx1"/>
+                </a:solidFill>
+                <a:effectLst/>
+                <a:latin typeface="Arial" panose="020B0604020202020204" pitchFamily="34" charset="0"/>
+              </a:rPr>
+              <a:t> applied to the training set to prevent bias towards majority class due to data imbalance. SMOTE works by creating synthetic data points between randomly-chosen k-nearest neighbor at random distances in the feature space. In practice, SMOTE should only be used on training data to prevent leakage. </a:t>
+            </a:r>
+          </a:p>
+          <a:p>
+            <a:pPr marL="0" marR="0" lvl="0" indent="0" algn="l" defTabSz="914400" rtl="0" eaLnBrk="0" fontAlgn="base" latinLnBrk="0" hangingPunct="0">
+              <a:lnSpc>
+                <a:spcPct val="100000"/>
+              </a:lnSpc>
+              <a:spcBef>
+                <a:spcPct val="0"/>
+              </a:spcBef>
+              <a:spcAft>
+                <a:spcPct val="0"/>
+              </a:spcAft>
+              <a:buClrTx/>
+              <a:buSzTx/>
+              <a:buFontTx/>
+              <a:buChar char="•"/>
+              <a:tabLst/>
+            </a:pPr>
+            <a:r>
+              <a:rPr kumimoji="0" lang="en-US" altLang="en-US" sz="1800" b="1" i="0" u="none" strike="noStrike" cap="none" normalizeH="0" baseline="0" dirty="0" err="1">
+                <a:ln>
+                  <a:noFill/>
+                </a:ln>
+                <a:solidFill>
+                  <a:schemeClr val="tx1"/>
+                </a:solidFill>
+                <a:effectLst/>
+                <a:latin typeface="Arial" panose="020B0604020202020204" pitchFamily="34" charset="0"/>
+              </a:rPr>
+              <a:t>UpSampling</a:t>
+            </a:r>
+            <a:r>
+              <a:rPr kumimoji="0" lang="en-US" altLang="en-US" sz="1800" b="1" i="0" u="none" strike="noStrike" cap="none" normalizeH="0" baseline="0" dirty="0">
+                <a:ln>
+                  <a:noFill/>
+                </a:ln>
+                <a:solidFill>
+                  <a:schemeClr val="tx1"/>
+                </a:solidFill>
+                <a:effectLst/>
+                <a:latin typeface="Arial" panose="020B0604020202020204" pitchFamily="34" charset="0"/>
+              </a:rPr>
+              <a:t>:</a:t>
+            </a:r>
+            <a:r>
+              <a:rPr kumimoji="0" lang="en-US" altLang="en-US" sz="1800" b="0" i="0" u="none" strike="noStrike" cap="none" normalizeH="0" baseline="0" dirty="0">
+                <a:ln>
+                  <a:noFill/>
+                </a:ln>
+                <a:solidFill>
+                  <a:schemeClr val="tx1"/>
+                </a:solidFill>
+                <a:effectLst/>
+                <a:latin typeface="Arial" panose="020B0604020202020204" pitchFamily="34" charset="0"/>
+              </a:rPr>
+              <a:t> applied to the training set to address significant imbalances between classes. </a:t>
+            </a:r>
+            <a:r>
+              <a:rPr kumimoji="0" lang="en-US" altLang="en-US" sz="1800" b="0" i="0" u="none" strike="noStrike" cap="none" normalizeH="0" baseline="0" dirty="0" err="1">
+                <a:ln>
+                  <a:noFill/>
+                </a:ln>
+                <a:solidFill>
+                  <a:schemeClr val="tx1"/>
+                </a:solidFill>
+                <a:effectLst/>
+                <a:latin typeface="Arial" panose="020B0604020202020204" pitchFamily="34" charset="0"/>
+              </a:rPr>
+              <a:t>upSample</a:t>
+            </a:r>
+            <a:r>
+              <a:rPr kumimoji="0" lang="en-US" altLang="en-US" sz="1800" b="0" i="0" u="none" strike="noStrike" cap="none" normalizeH="0" baseline="0" dirty="0">
+                <a:ln>
+                  <a:noFill/>
+                </a:ln>
+                <a:solidFill>
+                  <a:schemeClr val="tx1"/>
+                </a:solidFill>
+                <a:effectLst/>
+                <a:latin typeface="Arial" panose="020B0604020202020204" pitchFamily="34" charset="0"/>
+              </a:rPr>
+              <a:t> operates by increasing the number of instances of the minority class through duplication of random instances. </a:t>
+            </a:r>
+          </a:p>
+          <a:p>
+            <a:pPr marL="0" marR="0" lvl="0" indent="0" algn="l" defTabSz="914400" rtl="0" eaLnBrk="0" fontAlgn="base" latinLnBrk="0" hangingPunct="0">
+              <a:lnSpc>
+                <a:spcPct val="100000"/>
+              </a:lnSpc>
+              <a:spcBef>
+                <a:spcPct val="0"/>
+              </a:spcBef>
+              <a:spcAft>
+                <a:spcPct val="0"/>
+              </a:spcAft>
+              <a:buClrTx/>
+              <a:buSzTx/>
+              <a:buFontTx/>
+              <a:buChar char="•"/>
+              <a:tabLst/>
+            </a:pPr>
+            <a:r>
+              <a:rPr kumimoji="0" lang="en-US" altLang="en-US" sz="1800" b="1" i="0" u="none" strike="noStrike" cap="none" normalizeH="0" baseline="0" dirty="0">
+                <a:ln>
+                  <a:noFill/>
+                </a:ln>
+                <a:solidFill>
+                  <a:schemeClr val="tx1"/>
+                </a:solidFill>
+                <a:effectLst/>
+                <a:latin typeface="Arial" panose="020B0604020202020204" pitchFamily="34" charset="0"/>
+              </a:rPr>
+              <a:t>Principal Component Analysis (PCA)</a:t>
+            </a:r>
+            <a:r>
+              <a:rPr kumimoji="0" lang="en-US" altLang="en-US" sz="1800" b="0" i="0" u="none" strike="noStrike" cap="none" normalizeH="0" baseline="0" dirty="0">
+                <a:ln>
+                  <a:noFill/>
+                </a:ln>
+                <a:solidFill>
+                  <a:schemeClr val="tx1"/>
+                </a:solidFill>
+                <a:effectLst/>
+                <a:latin typeface="Arial" panose="020B0604020202020204" pitchFamily="34" charset="0"/>
+              </a:rPr>
+              <a:t>: applied to the training set to reduce data dimensionality used in Support Vector Machine (SVM). As discussed below, SVM works by building a decision boundary/hyperplane that best separates features. This process can be overly complicated on overly complex dataset </a:t>
+            </a:r>
           </a:p>
         </p:txBody>
       </p:sp>

</xml_diff>